<commit_message>
KPK Homework Formating +other stuff
</commit_message>
<xml_diff>
--- a/JS-2/Presentations/DOM-manipulation.pptx
+++ b/JS-2/Presentations/DOM-manipulation.pptx
@@ -256,7 +256,7 @@
           <a:p>
             <a:fld id="{FB79C81D-72B0-42C7-BF91-A4119E6021E9}" type="datetimeFigureOut">
               <a:rPr lang="en-US" smtClean="0"/>
-              <a:t>11-Apr-13</a:t>
+              <a:t>12-Apr-13</a:t>
             </a:fld>
             <a:endParaRPr lang="en-US"/>
           </a:p>
@@ -5723,28 +5723,22 @@
       </p:pic>
       <p:pic>
         <p:nvPicPr>
-          <p:cNvPr id="75" name="Picture 74"/>
+          <p:cNvPr id="67" name="Picture 66"/>
           <p:cNvPicPr>
             <a:picLocks noChangeAspect="1"/>
           </p:cNvPicPr>
           <p:nvPr/>
         </p:nvPicPr>
         <p:blipFill>
-          <a:blip r:embed="rId5" cstate="screen">
-            <a:extLst>
-              <a:ext uri="{28A0092B-C50C-407E-A947-70E740481C1C}">
-                <a14:useLocalDpi xmlns:a14="http://schemas.microsoft.com/office/drawing/2010/main"/>
-              </a:ext>
-            </a:extLst>
-          </a:blip>
+          <a:blip r:embed="rId5"/>
           <a:stretch>
             <a:fillRect/>
           </a:stretch>
         </p:blipFill>
         <p:spPr>
           <a:xfrm>
-            <a:off x="685800" y="876612"/>
-            <a:ext cx="2895600" cy="2266866"/>
+            <a:off x="732814" y="879613"/>
+            <a:ext cx="3000986" cy="2284134"/>
           </a:xfrm>
           <a:prstGeom prst="rect">
             <a:avLst/>
@@ -5823,7 +5817,7 @@
         </p:nvSpPr>
         <p:spPr>
           <a:xfrm>
-            <a:off x="228600" y="685800"/>
+            <a:off x="228600" y="762000"/>
             <a:ext cx="8686800" cy="5791200"/>
           </a:xfrm>
         </p:spPr>
@@ -5833,7 +5827,7 @@
           <a:p>
             <a:pPr>
               <a:lnSpc>
-                <a:spcPct val="100000"/>
+                <a:spcPct val="95000"/>
               </a:lnSpc>
             </a:pPr>
             <a:r>
@@ -5844,7 +5838,7 @@
           <a:p>
             <a:pPr lvl="1">
               <a:lnSpc>
-                <a:spcPct val="100000"/>
+                <a:spcPct val="95000"/>
               </a:lnSpc>
             </a:pPr>
             <a:r>
@@ -5874,7 +5868,7 @@
           <a:p>
             <a:pPr lvl="2">
               <a:lnSpc>
-                <a:spcPct val="100000"/>
+                <a:spcPct val="95000"/>
               </a:lnSpc>
             </a:pPr>
             <a:r>
@@ -5919,7 +5913,7 @@
           <a:p>
             <a:pPr lvl="1">
               <a:lnSpc>
-                <a:spcPct val="100000"/>
+                <a:spcPct val="95000"/>
               </a:lnSpc>
             </a:pPr>
             <a:r>
@@ -5949,7 +5943,7 @@
           <a:p>
             <a:pPr lvl="2">
               <a:lnSpc>
-                <a:spcPct val="100000"/>
+                <a:spcPct val="95000"/>
               </a:lnSpc>
             </a:pPr>
             <a:r>
@@ -6005,7 +5999,7 @@
           <a:p>
             <a:pPr lvl="1">
               <a:lnSpc>
-                <a:spcPct val="100000"/>
+                <a:spcPct val="95000"/>
               </a:lnSpc>
             </a:pPr>
             <a:r>
@@ -6063,12 +6057,16 @@
           <a:p>
             <a:pPr lvl="2">
               <a:lnSpc>
-                <a:spcPct val="100000"/>
+                <a:spcPct val="95000"/>
               </a:lnSpc>
             </a:pPr>
             <a:r>
               <a:rPr lang="en-US" dirty="0" smtClean="0"/>
-              <a:t>Returns as a string the text content of the element, without the tags</a:t>
+              <a:t>Returns as a string the text content of the element, without the </a:t>
+            </a:r>
+            <a:r>
+              <a:rPr lang="en-US" dirty="0" smtClean="0"/>
+              <a:t>tags</a:t>
             </a:r>
             <a:endParaRPr lang="en-US" dirty="0"/>
           </a:p>
@@ -7084,13 +7082,8 @@
             </a:pPr>
             <a:r>
               <a:rPr lang="en-US" dirty="0" smtClean="0"/>
-              <a:t>By Tag </a:t>
-            </a:r>
-            <a:r>
-              <a:rPr lang="en-US" dirty="0" smtClean="0"/>
-              <a:t>Name</a:t>
-            </a:r>
-            <a:endParaRPr lang="en-US" dirty="0" smtClean="0"/>
+              <a:t>By Tag Name</a:t>
+            </a:r>
           </a:p>
           <a:p>
             <a:pPr lvl="1">
@@ -7278,25 +7271,7 @@
                 <a:cs typeface="Consolas" pitchFamily="49" charset="0"/>
                 <a:sym typeface="Wingdings" pitchFamily="2" charset="2"/>
               </a:rPr>
-              <a:t>var posts = </a:t>
-            </a:r>
-            <a:r>
-              <a:rPr lang="en-US" sz="2000" b="1" noProof="1" smtClean="0">
-                <a:solidFill>
-                  <a:srgbClr val="8CF4F2"/>
-                </a:solidFill>
-                <a:effectLst>
-                  <a:outerShdw blurRad="38100" dist="38100" dir="2700000" algn="tl">
-                    <a:srgbClr val="000000">
-                      <a:alpha val="43137"/>
-                    </a:srgbClr>
-                  </a:outerShdw>
-                </a:effectLst>
-                <a:latin typeface="Consolas" pitchFamily="49" charset="0"/>
-                <a:cs typeface="Consolas" pitchFamily="49" charset="0"/>
-                <a:sym typeface="Wingdings" pitchFamily="2" charset="2"/>
-              </a:rPr>
-              <a:t>document.</a:t>
+              <a:t>var posts = document.</a:t>
             </a:r>
             <a:r>
               <a:rPr lang="en-US" sz="2000" b="1" noProof="1" smtClean="0">
@@ -12974,7 +12949,7 @@
             <a:pPr lvl="1"/>
             <a:r>
               <a:rPr lang="en-US" dirty="0" smtClean="0"/>
-              <a:t>With each appended element the DOM is </a:t>
+              <a:t>When an elements is appended to the DOM, it is </a:t>
             </a:r>
             <a:r>
               <a:rPr lang="en-US" dirty="0" smtClean="0">
@@ -12985,7 +12960,18 @@
                   </a:schemeClr>
                 </a:solidFill>
               </a:rPr>
-              <a:t>rendered anew</a:t>
+              <a:t>rendered </a:t>
+            </a:r>
+            <a:r>
+              <a:rPr lang="en-US" dirty="0" smtClean="0">
+                <a:solidFill>
+                  <a:schemeClr val="accent5">
+                    <a:lumMod val="20000"/>
+                    <a:lumOff val="80000"/>
+                  </a:schemeClr>
+                </a:solidFill>
+              </a:rPr>
+              <a:t>anew</a:t>
             </a:r>
           </a:p>
           <a:p>
@@ -14635,7 +14621,11 @@
             <a:pPr lvl="1"/>
             <a:r>
               <a:rPr lang="en-US" dirty="0" smtClean="0"/>
-              <a:t>His children can be altered</a:t>
+              <a:t>Its children </a:t>
+            </a:r>
+            <a:r>
+              <a:rPr lang="en-US" dirty="0" smtClean="0"/>
+              <a:t>can be altered</a:t>
             </a:r>
           </a:p>
           <a:p>
@@ -15541,25 +15531,7 @@
                 <a:cs typeface="Consolas" pitchFamily="49" charset="0"/>
                 <a:sym typeface="Wingdings" pitchFamily="2" charset="2"/>
               </a:rPr>
-              <a:t>div.style.display </a:t>
-            </a:r>
-            <a:r>
-              <a:rPr lang="en-US" sz="2000" b="1" noProof="1" smtClean="0">
-                <a:solidFill>
-                  <a:srgbClr val="8CF4F2"/>
-                </a:solidFill>
-                <a:effectLst>
-                  <a:outerShdw blurRad="38100" dist="38100" dir="2700000" algn="tl">
-                    <a:srgbClr val="000000">
-                      <a:alpha val="43137"/>
-                    </a:srgbClr>
-                  </a:outerShdw>
-                </a:effectLst>
-                <a:latin typeface="Consolas" pitchFamily="49" charset="0"/>
-                <a:cs typeface="Consolas" pitchFamily="49" charset="0"/>
-                <a:sym typeface="Wingdings" pitchFamily="2" charset="2"/>
-              </a:rPr>
-              <a:t>= "block";</a:t>
+              <a:t>div.style.display = "block";</a:t>
             </a:r>
           </a:p>
           <a:p>
@@ -15589,25 +15561,7 @@
                 <a:cs typeface="Consolas" pitchFamily="49" charset="0"/>
                 <a:sym typeface="Wingdings" pitchFamily="2" charset="2"/>
               </a:rPr>
-              <a:t>div.style.width </a:t>
-            </a:r>
-            <a:r>
-              <a:rPr lang="en-US" sz="2000" b="1" noProof="1" smtClean="0">
-                <a:solidFill>
-                  <a:srgbClr val="8CF4F2"/>
-                </a:solidFill>
-                <a:effectLst>
-                  <a:outerShdw blurRad="38100" dist="38100" dir="2700000" algn="tl">
-                    <a:srgbClr val="000000">
-                      <a:alpha val="43137"/>
-                    </a:srgbClr>
-                  </a:outerShdw>
-                </a:effectLst>
-                <a:latin typeface="Consolas" pitchFamily="49" charset="0"/>
-                <a:cs typeface="Consolas" pitchFamily="49" charset="0"/>
-                <a:sym typeface="Wingdings" pitchFamily="2" charset="2"/>
-              </a:rPr>
-              <a:t>= "</a:t>
+              <a:t>div.style.width = "</a:t>
             </a:r>
             <a:r>
               <a:rPr lang="en-US" sz="2000" b="1" noProof="1">
@@ -15773,7 +15727,24 @@
                 <a:latin typeface="+mn-lt"/>
                 <a:cs typeface="Consolas" pitchFamily="49" charset="0"/>
               </a:rPr>
-              <a:t>the value type</a:t>
+              <a:t>the </a:t>
+            </a:r>
+            <a:r>
+              <a:rPr lang="en-US" sz="2800" b="1" noProof="1" smtClean="0">
+                <a:solidFill>
+                  <a:srgbClr val="F7FFE7"/>
+                </a:solidFill>
+                <a:effectLst>
+                  <a:outerShdw blurRad="38100" dist="38100" dir="2700000" algn="tl">
+                    <a:srgbClr val="000000">
+                      <a:alpha val="43137"/>
+                    </a:srgbClr>
+                  </a:outerShdw>
+                </a:effectLst>
+                <a:latin typeface="+mn-lt"/>
+                <a:cs typeface="Consolas" pitchFamily="49" charset="0"/>
+              </a:rPr>
+              <a:t>unit</a:t>
             </a:r>
             <a:endParaRPr lang="en-US" sz="2800" b="1" noProof="1">
               <a:solidFill>
@@ -16111,12 +16082,12 @@
           <a:lstStyle/>
           <a:p>
             <a:r>
-              <a:rPr lang="en-US" dirty="0" err="1" smtClean="0"/>
-              <a:t>NodeList</a:t>
-            </a:r>
-            <a:r>
-              <a:rPr lang="en-US" dirty="0" smtClean="0"/>
-              <a:t> is the collection returned by the DOM selectors:</a:t>
+              <a:rPr lang="en-US" dirty="0" smtClean="0"/>
+              <a:t>NodeList </a:t>
+            </a:r>
+            <a:r>
+              <a:rPr lang="en-US" dirty="0" smtClean="0"/>
+              <a:t>is the collection returned by the DOM selectors:</a:t>
             </a:r>
           </a:p>
           <a:p>
@@ -16456,8 +16427,8 @@
         </p:nvSpPr>
         <p:spPr>
           <a:xfrm>
-            <a:off x="228600" y="1143000"/>
-            <a:ext cx="8686800" cy="5562600"/>
+            <a:off x="228600" y="1676400"/>
+            <a:ext cx="8686800" cy="4114800"/>
           </a:xfrm>
         </p:spPr>
         <p:txBody>
@@ -16533,15 +16504,13 @@
             </a:r>
             <a:r>
               <a:rPr lang="en-US" dirty="0" smtClean="0"/>
-              <a:t> the content and visual presentation of a web page</a:t>
-            </a:r>
-          </a:p>
-          <a:p>
-            <a:pPr lvl="1"/>
-            <a:r>
-              <a:rPr lang="en-US" dirty="0" smtClean="0"/>
-              <a:t>Links web pages to scripts and programming languages</a:t>
-            </a:r>
+              <a:t> the content and visual presentation of a web </a:t>
+            </a:r>
+            <a:r>
+              <a:rPr lang="en-US" dirty="0" smtClean="0"/>
+              <a:t>page</a:t>
+            </a:r>
+            <a:endParaRPr lang="en-US" dirty="0" smtClean="0"/>
           </a:p>
         </p:txBody>
       </p:sp>
@@ -16631,7 +16600,11 @@
           <a:p>
             <a:r>
               <a:rPr lang="en-US" dirty="0" smtClean="0"/>
-              <a:t>N0deList looks like an array, but is not an array</a:t>
+              <a:t>NodeList </a:t>
+            </a:r>
+            <a:r>
+              <a:rPr lang="en-US" dirty="0" smtClean="0"/>
+              <a:t>looks like an array, but is not an array</a:t>
             </a:r>
           </a:p>
           <a:p>
@@ -16906,7 +16879,43 @@
                 <a:cs typeface="Consolas" pitchFamily="49" charset="0"/>
                 <a:sym typeface="Wingdings" pitchFamily="2" charset="2"/>
               </a:rPr>
-              <a:t>//div[0] = ...</a:t>
+              <a:t>//</a:t>
+            </a:r>
+            <a:r>
+              <a:rPr lang="nn-NO" sz="2000" b="1" noProof="1" smtClean="0">
+                <a:solidFill>
+                  <a:srgbClr val="8CF4F2"/>
+                </a:solidFill>
+                <a:effectLst>
+                  <a:outerShdw blurRad="38100" dist="38100" dir="2700000" algn="tl">
+                    <a:srgbClr val="000000">
+                      <a:alpha val="43137"/>
+                    </a:srgbClr>
+                  </a:outerShdw>
+                </a:effectLst>
+                <a:latin typeface="Consolas" pitchFamily="49" charset="0"/>
+                <a:cs typeface="Consolas" pitchFamily="49" charset="0"/>
+                <a:sym typeface="Wingdings" pitchFamily="2" charset="2"/>
+              </a:rPr>
+              <a:t>divs[0</a:t>
+            </a:r>
+            <a:r>
+              <a:rPr lang="nn-NO" sz="2000" b="1" noProof="1" smtClean="0">
+                <a:solidFill>
+                  <a:srgbClr val="8CF4F2"/>
+                </a:solidFill>
+                <a:effectLst>
+                  <a:outerShdw blurRad="38100" dist="38100" dir="2700000" algn="tl">
+                    <a:srgbClr val="000000">
+                      <a:alpha val="43137"/>
+                    </a:srgbClr>
+                  </a:outerShdw>
+                </a:effectLst>
+                <a:latin typeface="Consolas" pitchFamily="49" charset="0"/>
+                <a:cs typeface="Consolas" pitchFamily="49" charset="0"/>
+                <a:sym typeface="Wingdings" pitchFamily="2" charset="2"/>
+              </a:rPr>
+              <a:t>] = ...</a:t>
             </a:r>
           </a:p>
           <a:p>
@@ -16954,7 +16963,43 @@
                 <a:cs typeface="Consolas" pitchFamily="49" charset="0"/>
                 <a:sym typeface="Wingdings" pitchFamily="2" charset="2"/>
               </a:rPr>
-              <a:t>/div[1] = ...</a:t>
+              <a:t>/</a:t>
+            </a:r>
+            <a:r>
+              <a:rPr lang="nn-NO" sz="2000" b="1" noProof="1" smtClean="0">
+                <a:solidFill>
+                  <a:srgbClr val="8CF4F2"/>
+                </a:solidFill>
+                <a:effectLst>
+                  <a:outerShdw blurRad="38100" dist="38100" dir="2700000" algn="tl">
+                    <a:srgbClr val="000000">
+                      <a:alpha val="43137"/>
+                    </a:srgbClr>
+                  </a:outerShdw>
+                </a:effectLst>
+                <a:latin typeface="Consolas" pitchFamily="49" charset="0"/>
+                <a:cs typeface="Consolas" pitchFamily="49" charset="0"/>
+                <a:sym typeface="Wingdings" pitchFamily="2" charset="2"/>
+              </a:rPr>
+              <a:t>divs[1</a:t>
+            </a:r>
+            <a:r>
+              <a:rPr lang="nn-NO" sz="2000" b="1" noProof="1" smtClean="0">
+                <a:solidFill>
+                  <a:srgbClr val="8CF4F2"/>
+                </a:solidFill>
+                <a:effectLst>
+                  <a:outerShdw blurRad="38100" dist="38100" dir="2700000" algn="tl">
+                    <a:srgbClr val="000000">
+                      <a:alpha val="43137"/>
+                    </a:srgbClr>
+                  </a:outerShdw>
+                </a:effectLst>
+                <a:latin typeface="Consolas" pitchFamily="49" charset="0"/>
+                <a:cs typeface="Consolas" pitchFamily="49" charset="0"/>
+                <a:sym typeface="Wingdings" pitchFamily="2" charset="2"/>
+              </a:rPr>
+              <a:t>] = ...</a:t>
             </a:r>
           </a:p>
           <a:p>
@@ -16987,7 +17032,49 @@
                 <a:cs typeface="Consolas" pitchFamily="49" charset="0"/>
                 <a:sym typeface="Wingdings" pitchFamily="2" charset="2"/>
               </a:rPr>
-              <a:t>//div[length] = ...</a:t>
+              <a:t>//</a:t>
+            </a:r>
+            <a:r>
+              <a:rPr lang="nn-NO" sz="2000" b="1" noProof="1" smtClean="0">
+                <a:solidFill>
+                  <a:schemeClr val="tx1">
+                    <a:lumMod val="20000"/>
+                    <a:lumOff val="80000"/>
+                  </a:schemeClr>
+                </a:solidFill>
+                <a:effectLst>
+                  <a:outerShdw blurRad="38100" dist="38100" dir="2700000" algn="tl">
+                    <a:srgbClr val="000000">
+                      <a:alpha val="43137"/>
+                    </a:srgbClr>
+                  </a:outerShdw>
+                </a:effectLst>
+                <a:latin typeface="Consolas" pitchFamily="49" charset="0"/>
+                <a:cs typeface="Consolas" pitchFamily="49" charset="0"/>
+                <a:sym typeface="Wingdings" pitchFamily="2" charset="2"/>
+              </a:rPr>
+              <a:t>divs[length</a:t>
+            </a:r>
+            <a:r>
+              <a:rPr lang="nn-NO" sz="2000" b="1" noProof="1" smtClean="0">
+                <a:solidFill>
+                  <a:schemeClr val="tx1">
+                    <a:lumMod val="20000"/>
+                    <a:lumOff val="80000"/>
+                  </a:schemeClr>
+                </a:solidFill>
+                <a:effectLst>
+                  <a:outerShdw blurRad="38100" dist="38100" dir="2700000" algn="tl">
+                    <a:srgbClr val="000000">
+                      <a:alpha val="43137"/>
+                    </a:srgbClr>
+                  </a:outerShdw>
+                </a:effectLst>
+                <a:latin typeface="Consolas" pitchFamily="49" charset="0"/>
+                <a:cs typeface="Consolas" pitchFamily="49" charset="0"/>
+                <a:sym typeface="Wingdings" pitchFamily="2" charset="2"/>
+              </a:rPr>
+              <a:t>] = ...</a:t>
             </a:r>
           </a:p>
           <a:p>
@@ -17430,7 +17517,15 @@
             </a:pPr>
             <a:r>
               <a:rPr lang="en-US" dirty="0" smtClean="0"/>
-              <a:t>Need to cache it length for better performance</a:t>
+              <a:t>Need to cache </a:t>
+            </a:r>
+            <a:r>
+              <a:rPr lang="en-US" dirty="0" smtClean="0"/>
+              <a:t>its </a:t>
+            </a:r>
+            <a:r>
+              <a:rPr lang="en-US" dirty="0" smtClean="0"/>
+              <a:t>length for better performance</a:t>
             </a:r>
           </a:p>
         </p:txBody>
@@ -19765,18 +19860,32 @@
             <p:ph idx="1"/>
           </p:nvPr>
         </p:nvSpPr>
-        <p:spPr/>
+        <p:spPr>
+          <a:xfrm>
+            <a:off x="228600" y="914400"/>
+            <a:ext cx="8686800" cy="5486400"/>
+          </a:xfrm>
+        </p:spPr>
         <p:txBody>
           <a:bodyPr/>
           <a:lstStyle/>
           <a:p>
+            <a:pPr>
+              <a:lnSpc>
+                <a:spcPct val="100000"/>
+              </a:lnSpc>
+            </a:pPr>
             <a:r>
               <a:rPr lang="en-US" dirty="0" smtClean="0"/>
               <a:t>The DOM API consist of objects with methods to interact with the HTML page</a:t>
             </a:r>
           </a:p>
           <a:p>
-            <a:pPr lvl="1"/>
+            <a:pPr lvl="1">
+              <a:lnSpc>
+                <a:spcPct val="100000"/>
+              </a:lnSpc>
+            </a:pPr>
             <a:r>
               <a:rPr lang="en-US" dirty="0" smtClean="0"/>
               <a:t>Can </a:t>
@@ -19813,7 +19922,11 @@
             </a:r>
           </a:p>
           <a:p>
-            <a:pPr lvl="1"/>
+            <a:pPr lvl="1">
+              <a:lnSpc>
+                <a:spcPct val="100000"/>
+              </a:lnSpc>
+            </a:pPr>
             <a:r>
               <a:rPr lang="en-US" dirty="0" smtClean="0"/>
               <a:t>Can </a:t>
@@ -19846,19 +19959,48 @@
             </a:r>
             <a:r>
               <a:rPr lang="en-US" dirty="0" smtClean="0"/>
-              <a:t> dynamically</a:t>
-            </a:r>
-          </a:p>
-          <a:p>
-            <a:r>
-              <a:rPr lang="en-US" dirty="0" smtClean="0"/>
-              <a:t>DOM introduces objects that represent HTML elements and their properties</a:t>
-            </a:r>
-          </a:p>
-          <a:p>
-            <a:pPr lvl="1"/>
-            <a:r>
-              <a:rPr lang="en-US" dirty="0" smtClean="0">
+              <a:t> </a:t>
+            </a:r>
+            <a:r>
+              <a:rPr lang="en-US" dirty="0" smtClean="0"/>
+              <a:t>dynamically</a:t>
+            </a:r>
+          </a:p>
+          <a:p>
+            <a:pPr lvl="1">
+              <a:lnSpc>
+                <a:spcPct val="100000"/>
+              </a:lnSpc>
+            </a:pPr>
+            <a:r>
+              <a:rPr lang="en-US" dirty="0" smtClean="0"/>
+              <a:t>Can add and remove HTML attributes</a:t>
+            </a:r>
+            <a:endParaRPr lang="en-US" dirty="0" smtClean="0"/>
+          </a:p>
+          <a:p>
+            <a:pPr>
+              <a:lnSpc>
+                <a:spcPct val="100000"/>
+              </a:lnSpc>
+            </a:pPr>
+            <a:r>
+              <a:rPr lang="en-US" dirty="0" smtClean="0"/>
+              <a:t>DOM introduces objects that represent HTML elements and their </a:t>
+            </a:r>
+            <a:r>
+              <a:rPr lang="en-US" dirty="0" smtClean="0"/>
+              <a:t>properties</a:t>
+            </a:r>
+          </a:p>
+          <a:p>
+            <a:pPr lvl="1">
+              <a:lnSpc>
+                <a:spcPct val="100000"/>
+              </a:lnSpc>
+            </a:pPr>
+            <a:r>
+              <a:rPr lang="en-US" dirty="0" err="1" smtClean="0">
                 <a:solidFill>
                   <a:schemeClr val="accent5">
                     <a:lumMod val="20000"/>
@@ -19868,11 +20010,11 @@
                 <a:latin typeface="Consolas" panose="020B0609020204030204" pitchFamily="49" charset="0"/>
                 <a:cs typeface="Consolas" panose="020B0609020204030204" pitchFamily="49" charset="0"/>
               </a:rPr>
-              <a:t>document</a:t>
-            </a:r>
-            <a:r>
-              <a:rPr lang="en-US" dirty="0" smtClean="0"/>
-              <a:t> object represents </a:t>
+              <a:t>document.documentElement</a:t>
+            </a:r>
+            <a:r>
+              <a:rPr lang="en-US" dirty="0" smtClean="0"/>
+              <a:t> is </a:t>
             </a:r>
             <a:r>
               <a:rPr lang="en-US" dirty="0" smtClean="0">
@@ -19887,13 +20029,14 @@
               </a:rPr>
               <a:t>&lt;html&gt;</a:t>
             </a:r>
-            <a:r>
-              <a:rPr lang="en-US" dirty="0"/>
-              <a:t> element</a:t>
-            </a:r>
-          </a:p>
-          <a:p>
-            <a:pPr lvl="1"/>
+            <a:endParaRPr lang="en-US" dirty="0" smtClean="0"/>
+          </a:p>
+          <a:p>
+            <a:pPr lvl="1">
+              <a:lnSpc>
+                <a:spcPct val="100000"/>
+              </a:lnSpc>
+            </a:pPr>
             <a:r>
               <a:rPr lang="en-US" dirty="0" err="1" smtClean="0">
                 <a:solidFill>
@@ -19909,7 +20052,11 @@
             </a:r>
             <a:r>
               <a:rPr lang="en-US" dirty="0" smtClean="0"/>
-              <a:t> object represents the body of the page</a:t>
+              <a:t> is the </a:t>
+            </a:r>
+            <a:r>
+              <a:rPr lang="en-US" dirty="0" smtClean="0"/>
+              <a:t>body of the page</a:t>
             </a:r>
           </a:p>
         </p:txBody>
@@ -20224,7 +20371,11 @@
             </a:pPr>
             <a:r>
               <a:rPr lang="en-US" dirty="0" smtClean="0"/>
-              <a:t>It represents the HTML element</a:t>
+              <a:t>It represents the </a:t>
+            </a:r>
+            <a:r>
+              <a:rPr lang="en-US" dirty="0" smtClean="0"/>
+              <a:t>entry point</a:t>
             </a:r>
             <a:endParaRPr lang="en-US" dirty="0">
               <a:solidFill>
@@ -20336,7 +20487,15 @@
             </a:r>
             <a:r>
               <a:rPr lang="en-US" dirty="0" smtClean="0"/>
-              <a:t> corresponding the their </a:t>
+              <a:t> </a:t>
+            </a:r>
+            <a:r>
+              <a:rPr lang="en-US" dirty="0" smtClean="0"/>
+              <a:t>that correspond to the </a:t>
+            </a:r>
+            <a:r>
+              <a:rPr lang="en-US" dirty="0" smtClean="0"/>
+              <a:t>their </a:t>
             </a:r>
             <a:r>
               <a:rPr lang="en-US" dirty="0" smtClean="0">
@@ -20353,8 +20512,16 @@
           <a:p>
             <a:pPr lvl="1"/>
             <a:r>
-              <a:rPr lang="en-US" dirty="0" smtClean="0"/>
-              <a:t>Id, </a:t>
+              <a:rPr lang="en-US" dirty="0"/>
+              <a:t>i</a:t>
+            </a:r>
+            <a:r>
+              <a:rPr lang="en-US" dirty="0" smtClean="0"/>
+              <a:t>d</a:t>
+            </a:r>
+            <a:r>
+              <a:rPr lang="en-US" dirty="0" smtClean="0"/>
+              <a:t>, </a:t>
             </a:r>
             <a:r>
               <a:rPr lang="en-US" dirty="0" err="1" smtClean="0"/>

</xml_diff>